<commit_message>
updated Day 10 training materials
</commit_message>
<xml_diff>
--- a/Day 8/Slides/8. The Big Picture/8-jquery-getting-started-m8-slides.pptx
+++ b/Day 8/Slides/8. The Big Picture/8-jquery-getting-started-m8-slides.pptx
@@ -225,7 +225,7 @@
           <a:p>
             <a:fld id="{3EFD42F7-718C-4B98-AAEC-167E6DDD60A7}" type="datetimeFigureOut">
               <a:rPr lang="en-US" smtClean="0"/>
-              <a:t>8/15/2023</a:t>
+              <a:t>8/17/2023</a:t>
             </a:fld>
             <a:endParaRPr lang="en-US"/>
           </a:p>
@@ -1414,7 +1414,7 @@
           <a:p>
             <a:fld id="{1D8BD707-D9CF-40AE-B4C6-C98DA3205C09}" type="datetimeFigureOut">
               <a:rPr lang="en-US"/>
-              <a:t>8/15/2023</a:t>
+              <a:t>8/17/2023</a:t>
             </a:fld>
             <a:endParaRPr lang="en-US"/>
           </a:p>
@@ -1593,7 +1593,7 @@
           <a:p>
             <a:fld id="{1D8BD707-D9CF-40AE-B4C6-C98DA3205C09}" type="datetimeFigureOut">
               <a:rPr lang="en-US"/>
-              <a:t>8/15/2023</a:t>
+              <a:t>8/17/2023</a:t>
             </a:fld>
             <a:endParaRPr lang="en-US"/>
           </a:p>
@@ -1809,7 +1809,7 @@
           <a:p>
             <a:fld id="{1D8BD707-D9CF-40AE-B4C6-C98DA3205C09}" type="datetimeFigureOut">
               <a:rPr lang="en-US"/>
-              <a:t>8/15/2023</a:t>
+              <a:t>8/17/2023</a:t>
             </a:fld>
             <a:endParaRPr lang="en-US"/>
           </a:p>
@@ -1959,7 +1959,7 @@
           <a:p>
             <a:fld id="{1D8BD707-D9CF-40AE-B4C6-C98DA3205C09}" type="datetimeFigureOut">
               <a:rPr lang="en-US"/>
-              <a:t>8/15/2023</a:t>
+              <a:t>8/17/2023</a:t>
             </a:fld>
             <a:endParaRPr lang="en-US"/>
           </a:p>
@@ -2080,7 +2080,7 @@
           <a:p>
             <a:fld id="{1D8BD707-D9CF-40AE-B4C6-C98DA3205C09}" type="datetimeFigureOut">
               <a:rPr lang="en-US"/>
-              <a:t>8/15/2023</a:t>
+              <a:t>8/17/2023</a:t>
             </a:fld>
             <a:endParaRPr lang="en-US"/>
           </a:p>
@@ -2330,7 +2330,7 @@
           <a:p>
             <a:fld id="{1D8BD707-D9CF-40AE-B4C6-C98DA3205C09}" type="datetimeFigureOut">
               <a:rPr lang="en-US"/>
-              <a:t>8/15/2023</a:t>
+              <a:t>8/17/2023</a:t>
             </a:fld>
             <a:endParaRPr lang="en-US"/>
           </a:p>
@@ -3374,7 +3374,7 @@
         </p:nvGrpSpPr>
         <p:grpSpPr>
           <a:xfrm>
-            <a:off x="0" y="0"/>
+            <a:off x="-45720" y="0"/>
             <a:ext cx="12192000" cy="6430645"/>
             <a:chOff x="0" y="0"/>
             <a:chExt cx="12192000" cy="6430645"/>
@@ -7887,7 +7887,7 @@
               </a:rPr>
               <a:t>8</a:t>
             </a:r>
-            <a:endParaRPr sz="2800">
+            <a:endParaRPr sz="2800" dirty="0">
               <a:latin typeface="Trebuchet MS" panose="020B0603020202020204"/>
               <a:cs typeface="Trebuchet MS" panose="020B0603020202020204"/>
             </a:endParaRPr>

</xml_diff>